<commit_message>
new version with updated pp slides
</commit_message>
<xml_diff>
--- a/Scrapper.pptx
+++ b/Scrapper.pptx
@@ -203,7 +203,7 @@
           <a:p>
             <a:fld id="{AA22891B-F260-41A9-AB7C-C050A1339C77}" type="datetimeFigureOut">
               <a:rPr lang="en-US" smtClean="0"/>
-              <a:t>6/15/2018</a:t>
+              <a:t>7/4/2018</a:t>
             </a:fld>
             <a:endParaRPr lang="en-US"/>
           </a:p>
@@ -743,7 +743,7 @@
             <a:fld id="{B61BEF0D-F0BB-DE4B-95CE-6DB70DBA9567}" type="datetimeFigureOut">
               <a:rPr lang="en-US" smtClean="0"/>
               <a:pPr/>
-              <a:t>6/15/2018</a:t>
+              <a:t>7/4/2018</a:t>
             </a:fld>
             <a:endParaRPr lang="en-US" dirty="0"/>
           </a:p>
@@ -1083,7 +1083,7 @@
             <a:fld id="{B61BEF0D-F0BB-DE4B-95CE-6DB70DBA9567}" type="datetimeFigureOut">
               <a:rPr lang="en-US" smtClean="0"/>
               <a:pPr/>
-              <a:t>6/15/2018</a:t>
+              <a:t>7/4/2018</a:t>
             </a:fld>
             <a:endParaRPr lang="en-US" dirty="0"/>
           </a:p>
@@ -1486,7 +1486,7 @@
             <a:fld id="{B61BEF0D-F0BB-DE4B-95CE-6DB70DBA9567}" type="datetimeFigureOut">
               <a:rPr lang="en-US" smtClean="0"/>
               <a:pPr/>
-              <a:t>6/15/2018</a:t>
+              <a:t>7/4/2018</a:t>
             </a:fld>
             <a:endParaRPr lang="en-US" dirty="0"/>
           </a:p>
@@ -1824,7 +1824,7 @@
             <a:fld id="{B61BEF0D-F0BB-DE4B-95CE-6DB70DBA9567}" type="datetimeFigureOut">
               <a:rPr lang="en-US" smtClean="0"/>
               <a:pPr/>
-              <a:t>6/15/2018</a:t>
+              <a:t>7/4/2018</a:t>
             </a:fld>
             <a:endParaRPr lang="en-US" dirty="0"/>
           </a:p>
@@ -2146,7 +2146,7 @@
             <a:fld id="{B61BEF0D-F0BB-DE4B-95CE-6DB70DBA9567}" type="datetimeFigureOut">
               <a:rPr lang="en-US" smtClean="0"/>
               <a:pPr/>
-              <a:t>6/15/2018</a:t>
+              <a:t>7/4/2018</a:t>
             </a:fld>
             <a:endParaRPr lang="en-US" dirty="0"/>
           </a:p>
@@ -2544,7 +2544,7 @@
             <a:fld id="{B61BEF0D-F0BB-DE4B-95CE-6DB70DBA9567}" type="datetimeFigureOut">
               <a:rPr lang="en-US" smtClean="0"/>
               <a:pPr/>
-              <a:t>6/15/2018</a:t>
+              <a:t>7/4/2018</a:t>
             </a:fld>
             <a:endParaRPr lang="en-US" dirty="0"/>
           </a:p>
@@ -2803,7 +2803,7 @@
             <a:fld id="{B61BEF0D-F0BB-DE4B-95CE-6DB70DBA9567}" type="datetimeFigureOut">
               <a:rPr lang="en-US" smtClean="0"/>
               <a:pPr/>
-              <a:t>6/15/2018</a:t>
+              <a:t>7/4/2018</a:t>
             </a:fld>
             <a:endParaRPr lang="en-US" dirty="0"/>
           </a:p>
@@ -3067,7 +3067,7 @@
             <a:fld id="{B61BEF0D-F0BB-DE4B-95CE-6DB70DBA9567}" type="datetimeFigureOut">
               <a:rPr lang="en-US" smtClean="0"/>
               <a:pPr/>
-              <a:t>6/15/2018</a:t>
+              <a:t>7/4/2018</a:t>
             </a:fld>
             <a:endParaRPr lang="en-US" dirty="0"/>
           </a:p>
@@ -3331,7 +3331,7 @@
             <a:fld id="{B61BEF0D-F0BB-DE4B-95CE-6DB70DBA9567}" type="datetimeFigureOut">
               <a:rPr lang="en-US" smtClean="0"/>
               <a:pPr/>
-              <a:t>6/15/2018</a:t>
+              <a:t>7/4/2018</a:t>
             </a:fld>
             <a:endParaRPr lang="en-US" dirty="0"/>
           </a:p>
@@ -3662,7 +3662,7 @@
             <a:fld id="{B61BEF0D-F0BB-DE4B-95CE-6DB70DBA9567}" type="datetimeFigureOut">
               <a:rPr lang="en-US" smtClean="0"/>
               <a:pPr/>
-              <a:t>6/15/2018</a:t>
+              <a:t>7/4/2018</a:t>
             </a:fld>
             <a:endParaRPr lang="en-US" dirty="0"/>
           </a:p>
@@ -3987,7 +3987,7 @@
             <a:fld id="{B61BEF0D-F0BB-DE4B-95CE-6DB70DBA9567}" type="datetimeFigureOut">
               <a:rPr lang="en-US" smtClean="0"/>
               <a:pPr/>
-              <a:t>6/15/2018</a:t>
+              <a:t>7/4/2018</a:t>
             </a:fld>
             <a:endParaRPr lang="en-US" dirty="0"/>
           </a:p>
@@ -4446,7 +4446,7 @@
             <a:fld id="{B61BEF0D-F0BB-DE4B-95CE-6DB70DBA9567}" type="datetimeFigureOut">
               <a:rPr lang="en-US" smtClean="0"/>
               <a:pPr/>
-              <a:t>6/15/2018</a:t>
+              <a:t>7/4/2018</a:t>
             </a:fld>
             <a:endParaRPr lang="en-US" dirty="0"/>
           </a:p>
@@ -4653,7 +4653,7 @@
             <a:fld id="{B61BEF0D-F0BB-DE4B-95CE-6DB70DBA9567}" type="datetimeFigureOut">
               <a:rPr lang="en-US" smtClean="0"/>
               <a:pPr/>
-              <a:t>6/15/2018</a:t>
+              <a:t>7/4/2018</a:t>
             </a:fld>
             <a:endParaRPr lang="en-US" dirty="0"/>
           </a:p>
@@ -4832,7 +4832,7 @@
             <a:fld id="{B61BEF0D-F0BB-DE4B-95CE-6DB70DBA9567}" type="datetimeFigureOut">
               <a:rPr lang="en-US" smtClean="0"/>
               <a:pPr/>
-              <a:t>6/15/2018</a:t>
+              <a:t>7/4/2018</a:t>
             </a:fld>
             <a:endParaRPr lang="en-US" dirty="0"/>
           </a:p>
@@ -5167,7 +5167,7 @@
             <a:fld id="{B61BEF0D-F0BB-DE4B-95CE-6DB70DBA9567}" type="datetimeFigureOut">
               <a:rPr lang="en-US" smtClean="0"/>
               <a:pPr/>
-              <a:t>6/15/2018</a:t>
+              <a:t>7/4/2018</a:t>
             </a:fld>
             <a:endParaRPr lang="en-US" dirty="0"/>
           </a:p>
@@ -5514,7 +5514,7 @@
             <a:fld id="{B61BEF0D-F0BB-DE4B-95CE-6DB70DBA9567}" type="datetimeFigureOut">
               <a:rPr lang="en-US" smtClean="0"/>
               <a:pPr/>
-              <a:t>6/15/2018</a:t>
+              <a:t>7/4/2018</a:t>
             </a:fld>
             <a:endParaRPr lang="en-US" dirty="0"/>
           </a:p>
@@ -7633,7 +7633,7 @@
             <a:fld id="{B61BEF0D-F0BB-DE4B-95CE-6DB70DBA9567}" type="datetimeFigureOut">
               <a:rPr lang="en-US" smtClean="0"/>
               <a:pPr/>
-              <a:t>6/15/2018</a:t>
+              <a:t>7/4/2018</a:t>
             </a:fld>
             <a:endParaRPr lang="en-US" dirty="0"/>
           </a:p>
@@ -8217,7 +8217,7 @@
           <a:p>
             <a:r>
               <a:rPr lang="en-US" dirty="0"/>
-              <a:t>Cycle 5 – Green Team</a:t>
+              <a:t>Cycle 8 – Green Team</a:t>
             </a:r>
           </a:p>
         </p:txBody>
@@ -8414,7 +8414,9 @@
         </p:nvSpPr>
         <p:spPr/>
         <p:txBody>
-          <a:bodyPr/>
+          <a:bodyPr>
+            <a:normAutofit fontScale="92500" lnSpcReduction="10000"/>
+          </a:bodyPr>
           <a:lstStyle/>
           <a:p>
             <a:r>
@@ -8431,6 +8433,20 @@
           <a:p>
             <a:r>
               <a:rPr lang="en-US" dirty="0"/>
+              <a:t>Run Scrapper</a:t>
+            </a:r>
+          </a:p>
+          <a:p>
+            <a:pPr lvl="1"/>
+            <a:r>
+              <a:rPr lang="en-US" dirty="0"/>
+              <a:t>First create a text file with the list of websites</a:t>
+            </a:r>
+          </a:p>
+          <a:p>
+            <a:pPr lvl="1"/>
+            <a:r>
+              <a:rPr lang="en-US" dirty="0"/>
               <a:t>Scrapper is run from the command line as administrator</a:t>
             </a:r>
           </a:p>
@@ -8438,26 +8454,34 @@
             <a:pPr lvl="1"/>
             <a:r>
               <a:rPr lang="en-US" dirty="0"/>
-              <a:t>Ex: python scrapper.py </a:t>
-            </a:r>
-            <a:r>
-              <a:rPr lang="en-US" dirty="0">
-                <a:hlinkClick r:id="rId2"/>
-              </a:rPr>
-              <a:t>https://www.nameofwebsite.com</a:t>
-            </a:r>
-            <a:endParaRPr lang="en-US" dirty="0"/>
+              <a:t>Ex: python scrapper.py websites.txt</a:t>
+            </a:r>
           </a:p>
           <a:p>
             <a:r>
               <a:rPr lang="en-US" dirty="0"/>
-              <a:t>Will display all links found on the webpage</a:t>
-            </a:r>
-          </a:p>
-          <a:p>
+              <a:t>Creates a directory in C with name of website</a:t>
+            </a:r>
+          </a:p>
+          <a:p>
+            <a:pPr lvl="1"/>
             <a:r>
               <a:rPr lang="en-US" dirty="0"/>
-              <a:t>Will save html to a directory on C drive</a:t>
+              <a:t>Will save all links found on the webpage in a .txt file</a:t>
+            </a:r>
+          </a:p>
+          <a:p>
+            <a:pPr lvl="1"/>
+            <a:r>
+              <a:rPr lang="en-US" dirty="0"/>
+              <a:t>Will save html to directory as .html</a:t>
+            </a:r>
+          </a:p>
+          <a:p>
+            <a:pPr lvl="1"/>
+            <a:r>
+              <a:rPr lang="en-US" dirty="0"/>
+              <a:t>Will save the robots.txt file</a:t>
             </a:r>
           </a:p>
         </p:txBody>
@@ -8542,8 +8566,12 @@
           <a:lstStyle/>
           <a:p>
             <a:r>
+              <a:rPr lang="en-US" strike="sngStrike" dirty="0"/>
+              <a:t>Command line  </a:t>
+            </a:r>
+            <a:r>
               <a:rPr lang="en-US" dirty="0"/>
-              <a:t>Command line options to scrap a website for:</a:t>
+              <a:t> GUI options to scrap a website for:</a:t>
             </a:r>
           </a:p>
           <a:p>
@@ -8588,6 +8616,32 @@
           <a:p>
             <a:r>
               <a:rPr lang="en-US" dirty="0"/>
+              <a:t>Allow user to specify where to download files</a:t>
+            </a:r>
+          </a:p>
+          <a:p>
+            <a:r>
+              <a:rPr lang="en-US" dirty="0"/>
+              <a:t>Identify </a:t>
+            </a:r>
+            <a:r>
+              <a:rPr lang="en-US" dirty="0" err="1"/>
+              <a:t>nonhtml</a:t>
+            </a:r>
+            <a:r>
+              <a:rPr lang="en-US" dirty="0"/>
+              <a:t> files and show them</a:t>
+            </a:r>
+          </a:p>
+          <a:p>
+            <a:r>
+              <a:rPr lang="en-US" strike="sngStrike" dirty="0"/>
+              <a:t>Allow scraping of more than one website</a:t>
+            </a:r>
+          </a:p>
+          <a:p>
+            <a:r>
+              <a:rPr lang="en-US" dirty="0"/>
               <a:t>Crawl http and https websites not using common ports </a:t>
             </a:r>
           </a:p>
@@ -8599,34 +8653,6 @@
             </a:r>
           </a:p>
           <a:p>
-            <a:r>
-              <a:rPr lang="en-US" dirty="0"/>
-              <a:t>Allow user to specify where to download files</a:t>
-            </a:r>
-          </a:p>
-          <a:p>
-            <a:r>
-              <a:rPr lang="en-US" dirty="0"/>
-              <a:t>Identify </a:t>
-            </a:r>
-            <a:r>
-              <a:rPr lang="en-US" dirty="0" err="1"/>
-              <a:t>nonhtml</a:t>
-            </a:r>
-            <a:r>
-              <a:rPr lang="en-US" dirty="0"/>
-              <a:t> files and show them</a:t>
-            </a:r>
-          </a:p>
-          <a:p>
-            <a:r>
-              <a:rPr lang="en-US" dirty="0"/>
-              <a:t>Allow scraping of </a:t>
-            </a:r>
-            <a:r>
-              <a:rPr lang="en-US"/>
-              <a:t>more than one website</a:t>
-            </a:r>
             <a:endParaRPr lang="en-US" dirty="0"/>
           </a:p>
           <a:p>

</xml_diff>